<commit_message>
Update Model class diagram to remove Person - - > Tag
</commit_message>
<xml_diff>
--- a/docs/diagrams/ModelComponentClassDiagram.pptx
+++ b/docs/diagrams/ModelComponentClassDiagram.pptx
@@ -192,7 +192,7 @@
           <a:p>
             <a:fld id="{F5CC4B3F-88C1-4FFA-B1B6-F41C21DC6924}" type="datetimeFigureOut">
               <a:rPr lang="en-US" smtClean="0"/>
-              <a:t>10/16/2016</a:t>
+              <a:t>11/19/2016</a:t>
             </a:fld>
             <a:endParaRPr lang="en-US"/>
           </a:p>
@@ -641,7 +641,7 @@
           <a:p>
             <a:fld id="{78C97017-6FC3-485B-9764-EAC9E56C1D49}" type="datetimeFigureOut">
               <a:rPr lang="en-US" smtClean="0"/>
-              <a:t>10/16/2016</a:t>
+              <a:t>11/19/2016</a:t>
             </a:fld>
             <a:endParaRPr lang="en-US"/>
           </a:p>
@@ -811,7 +811,7 @@
           <a:p>
             <a:fld id="{78C97017-6FC3-485B-9764-EAC9E56C1D49}" type="datetimeFigureOut">
               <a:rPr lang="en-US" smtClean="0"/>
-              <a:t>10/16/2016</a:t>
+              <a:t>11/19/2016</a:t>
             </a:fld>
             <a:endParaRPr lang="en-US"/>
           </a:p>
@@ -991,7 +991,7 @@
           <a:p>
             <a:fld id="{78C97017-6FC3-485B-9764-EAC9E56C1D49}" type="datetimeFigureOut">
               <a:rPr lang="en-US" smtClean="0"/>
-              <a:t>10/16/2016</a:t>
+              <a:t>11/19/2016</a:t>
             </a:fld>
             <a:endParaRPr lang="en-US"/>
           </a:p>
@@ -1161,7 +1161,7 @@
           <a:p>
             <a:fld id="{78C97017-6FC3-485B-9764-EAC9E56C1D49}" type="datetimeFigureOut">
               <a:rPr lang="en-US" smtClean="0"/>
-              <a:t>10/16/2016</a:t>
+              <a:t>11/19/2016</a:t>
             </a:fld>
             <a:endParaRPr lang="en-US"/>
           </a:p>
@@ -1407,7 +1407,7 @@
           <a:p>
             <a:fld id="{78C97017-6FC3-485B-9764-EAC9E56C1D49}" type="datetimeFigureOut">
               <a:rPr lang="en-US" smtClean="0"/>
-              <a:t>10/16/2016</a:t>
+              <a:t>11/19/2016</a:t>
             </a:fld>
             <a:endParaRPr lang="en-US"/>
           </a:p>
@@ -1695,7 +1695,7 @@
           <a:p>
             <a:fld id="{78C97017-6FC3-485B-9764-EAC9E56C1D49}" type="datetimeFigureOut">
               <a:rPr lang="en-US" smtClean="0"/>
-              <a:t>10/16/2016</a:t>
+              <a:t>11/19/2016</a:t>
             </a:fld>
             <a:endParaRPr lang="en-US"/>
           </a:p>
@@ -2117,7 +2117,7 @@
           <a:p>
             <a:fld id="{78C97017-6FC3-485B-9764-EAC9E56C1D49}" type="datetimeFigureOut">
               <a:rPr lang="en-US" smtClean="0"/>
-              <a:t>10/16/2016</a:t>
+              <a:t>11/19/2016</a:t>
             </a:fld>
             <a:endParaRPr lang="en-US"/>
           </a:p>
@@ -2235,7 +2235,7 @@
           <a:p>
             <a:fld id="{78C97017-6FC3-485B-9764-EAC9E56C1D49}" type="datetimeFigureOut">
               <a:rPr lang="en-US" smtClean="0"/>
-              <a:t>10/16/2016</a:t>
+              <a:t>11/19/2016</a:t>
             </a:fld>
             <a:endParaRPr lang="en-US"/>
           </a:p>
@@ -2330,7 +2330,7 @@
           <a:p>
             <a:fld id="{78C97017-6FC3-485B-9764-EAC9E56C1D49}" type="datetimeFigureOut">
               <a:rPr lang="en-US" smtClean="0"/>
-              <a:t>10/16/2016</a:t>
+              <a:t>11/19/2016</a:t>
             </a:fld>
             <a:endParaRPr lang="en-US"/>
           </a:p>
@@ -2607,7 +2607,7 @@
           <a:p>
             <a:fld id="{78C97017-6FC3-485B-9764-EAC9E56C1D49}" type="datetimeFigureOut">
               <a:rPr lang="en-US" smtClean="0"/>
-              <a:t>10/16/2016</a:t>
+              <a:t>11/19/2016</a:t>
             </a:fld>
             <a:endParaRPr lang="en-US"/>
           </a:p>
@@ -2860,7 +2860,7 @@
           <a:p>
             <a:fld id="{78C97017-6FC3-485B-9764-EAC9E56C1D49}" type="datetimeFigureOut">
               <a:rPr lang="en-US" smtClean="0"/>
-              <a:t>10/16/2016</a:t>
+              <a:t>11/19/2016</a:t>
             </a:fld>
             <a:endParaRPr lang="en-US"/>
           </a:p>
@@ -3073,7 +3073,7 @@
           <a:p>
             <a:fld id="{78C97017-6FC3-485B-9764-EAC9E56C1D49}" type="datetimeFigureOut">
               <a:rPr lang="en-US" smtClean="0"/>
-              <a:t>10/16/2016</a:t>
+              <a:t>11/19/2016</a:t>
             </a:fld>
             <a:endParaRPr lang="en-US"/>
           </a:p>
@@ -3632,14 +3632,13 @@
           <p:cNvPr id="53" name="Elbow Connector 63"/>
           <p:cNvCxnSpPr>
             <a:stCxn id="71" idx="3"/>
-            <a:endCxn id="62" idx="2"/>
           </p:cNvCxnSpPr>
           <p:nvPr/>
         </p:nvCxnSpPr>
         <p:spPr>
           <a:xfrm flipV="1">
-            <a:off x="6477000" y="3204826"/>
-            <a:ext cx="190770" cy="405819"/>
+            <a:off x="6477000" y="3194131"/>
+            <a:ext cx="95385" cy="416514"/>
           </a:xfrm>
           <a:prstGeom prst="bentConnector2">
             <a:avLst/>
@@ -3832,48 +3831,6 @@
       </p:sp>
       <p:cxnSp>
         <p:nvCxnSpPr>
-          <p:cNvPr id="55" name="Straight Arrow Connector 54"/>
-          <p:cNvCxnSpPr>
-            <a:stCxn id="62" idx="0"/>
-            <a:endCxn id="67" idx="2"/>
-          </p:cNvCxnSpPr>
-          <p:nvPr/>
-        </p:nvCxnSpPr>
-        <p:spPr>
-          <a:xfrm flipV="1">
-            <a:off x="6667770" y="2632344"/>
-            <a:ext cx="1612" cy="225722"/>
-          </a:xfrm>
-          <a:prstGeom prst="straightConnector1">
-            <a:avLst/>
-          </a:prstGeom>
-          <a:ln w="19050">
-            <a:solidFill>
-              <a:srgbClr val="7030A0"/>
-            </a:solidFill>
-            <a:prstDash val="sysDot"/>
-            <a:headEnd type="none" w="med" len="med"/>
-            <a:tailEnd type="arrow" w="med" len="med"/>
-          </a:ln>
-          <a:effectLst/>
-        </p:spPr>
-        <p:style>
-          <a:lnRef idx="1">
-            <a:schemeClr val="accent2"/>
-          </a:lnRef>
-          <a:fillRef idx="2">
-            <a:schemeClr val="accent2"/>
-          </a:fillRef>
-          <a:effectRef idx="1">
-            <a:schemeClr val="accent2"/>
-          </a:effectRef>
-          <a:fontRef idx="minor">
-            <a:schemeClr val="dk1"/>
-          </a:fontRef>
-        </p:style>
-      </p:cxnSp>
-      <p:cxnSp>
-        <p:nvCxnSpPr>
           <p:cNvPr id="58" name="Straight Arrow Connector 57"/>
           <p:cNvCxnSpPr>
             <a:stCxn id="42" idx="3"/>
@@ -4387,7 +4344,7 @@
         </p:nvSpPr>
         <p:spPr>
           <a:xfrm>
-            <a:off x="4503204" y="2280569"/>
+            <a:off x="4477328" y="2280569"/>
             <a:ext cx="1156969" cy="346760"/>
           </a:xfrm>
           <a:prstGeom prst="rect">
@@ -4447,7 +4404,7 @@
         <p:spPr>
           <a:xfrm flipV="1">
             <a:off x="4220351" y="2453949"/>
-            <a:ext cx="282853" cy="306732"/>
+            <a:ext cx="256977" cy="306732"/>
           </a:xfrm>
           <a:prstGeom prst="bentConnector3">
             <a:avLst>
@@ -4628,8 +4585,8 @@
         </p:nvSpPr>
         <p:spPr>
           <a:xfrm>
-            <a:off x="6315289" y="2285584"/>
-            <a:ext cx="708186" cy="346760"/>
+            <a:off x="5336105" y="1809332"/>
+            <a:ext cx="483700" cy="346760"/>
           </a:xfrm>
           <a:prstGeom prst="rect">
             <a:avLst/>
@@ -4683,8 +4640,8 @@
           <p:nvPr/>
         </p:nvSpPr>
         <p:spPr>
-          <a:xfrm>
-            <a:off x="5672547" y="2371497"/>
+          <a:xfrm rot="16200000">
+            <a:off x="4921666" y="2066540"/>
             <a:ext cx="236048" cy="173380"/>
           </a:xfrm>
           <a:prstGeom prst="flowChartDecision">
@@ -4731,11 +4688,11 @@
           <p:nvPr/>
         </p:nvCxnSpPr>
         <p:spPr>
-          <a:xfrm>
-            <a:off x="5908595" y="2458187"/>
-            <a:ext cx="406694" cy="777"/>
-          </a:xfrm>
-          <a:prstGeom prst="bentConnector3">
+          <a:xfrm rot="5400000" flipH="1" flipV="1">
+            <a:off x="5161650" y="1860752"/>
+            <a:ext cx="52494" cy="296415"/>
+          </a:xfrm>
+          <a:prstGeom prst="bentConnector2">
             <a:avLst/>
           </a:prstGeom>
           <a:ln w="19050">
@@ -5438,7 +5395,7 @@
         </p:nvSpPr>
         <p:spPr>
           <a:xfrm rot="16200000">
-            <a:off x="6581354" y="3514530"/>
+            <a:off x="6527512" y="3586305"/>
             <a:ext cx="881018" cy="261610"/>
           </a:xfrm>
           <a:prstGeom prst="rect">
@@ -5590,6 +5547,359 @@
           </a:fontRef>
         </p:style>
       </p:cxnSp>
+      <p:cxnSp>
+        <p:nvCxnSpPr>
+          <p:cNvPr id="50" name="Elbow Connector 49"/>
+          <p:cNvCxnSpPr>
+            <a:stCxn id="62" idx="0"/>
+            <a:endCxn id="57" idx="3"/>
+          </p:cNvCxnSpPr>
+          <p:nvPr/>
+        </p:nvCxnSpPr>
+        <p:spPr>
+          <a:xfrm rot="16200000" flipV="1">
+            <a:off x="5948976" y="2139271"/>
+            <a:ext cx="404117" cy="1033473"/>
+          </a:xfrm>
+          <a:prstGeom prst="bentConnector2">
+            <a:avLst/>
+          </a:prstGeom>
+          <a:ln w="19050">
+            <a:solidFill>
+              <a:srgbClr val="7030A0"/>
+            </a:solidFill>
+            <a:headEnd type="none" w="med" len="med"/>
+            <a:tailEnd type="arrow" w="med" len="med"/>
+          </a:ln>
+          <a:effectLst/>
+        </p:spPr>
+        <p:style>
+          <a:lnRef idx="1">
+            <a:schemeClr val="accent2"/>
+          </a:lnRef>
+          <a:fillRef idx="2">
+            <a:schemeClr val="accent2"/>
+          </a:fillRef>
+          <a:effectRef idx="1">
+            <a:schemeClr val="accent2"/>
+          </a:effectRef>
+          <a:fontRef idx="minor">
+            <a:schemeClr val="dk1"/>
+          </a:fontRef>
+        </p:style>
+      </p:cxnSp>
+      <p:sp>
+        <p:nvSpPr>
+          <p:cNvPr id="11" name="TextBox 10"/>
+          <p:cNvSpPr txBox="1"/>
+          <p:nvPr/>
+        </p:nvSpPr>
+        <p:spPr>
+          <a:xfrm>
+            <a:off x="4324972" y="2191228"/>
+            <a:ext cx="189257" cy="178683"/>
+          </a:xfrm>
+          <a:prstGeom prst="rect">
+            <a:avLst/>
+          </a:prstGeom>
+          <a:noFill/>
+        </p:spPr>
+        <p:txBody>
+          <a:bodyPr wrap="square" lIns="0" tIns="0" rIns="0" bIns="0" rtlCol="0">
+            <a:noAutofit/>
+          </a:bodyPr>
+          <a:lstStyle/>
+          <a:p>
+            <a:pPr algn="ctr"/>
+            <a:r>
+              <a:rPr lang="en-US" sz="1100" dirty="0" smtClean="0">
+                <a:solidFill>
+                  <a:srgbClr val="7030A0"/>
+                </a:solidFill>
+              </a:rPr>
+              <a:t>1</a:t>
+            </a:r>
+            <a:endParaRPr lang="en-SG" sz="1100" dirty="0">
+              <a:solidFill>
+                <a:srgbClr val="7030A0"/>
+              </a:solidFill>
+            </a:endParaRPr>
+          </a:p>
+        </p:txBody>
+      </p:sp>
+      <p:sp>
+        <p:nvSpPr>
+          <p:cNvPr id="54" name="TextBox 53"/>
+          <p:cNvSpPr txBox="1"/>
+          <p:nvPr/>
+        </p:nvSpPr>
+        <p:spPr>
+          <a:xfrm>
+            <a:off x="4324972" y="3058864"/>
+            <a:ext cx="189257" cy="178683"/>
+          </a:xfrm>
+          <a:prstGeom prst="rect">
+            <a:avLst/>
+          </a:prstGeom>
+          <a:noFill/>
+        </p:spPr>
+        <p:txBody>
+          <a:bodyPr wrap="square" lIns="0" tIns="0" rIns="0" bIns="0" rtlCol="0">
+            <a:noAutofit/>
+          </a:bodyPr>
+          <a:lstStyle/>
+          <a:p>
+            <a:pPr algn="ctr"/>
+            <a:r>
+              <a:rPr lang="en-US" sz="1100" dirty="0" smtClean="0">
+                <a:solidFill>
+                  <a:srgbClr val="7030A0"/>
+                </a:solidFill>
+              </a:rPr>
+              <a:t>1</a:t>
+            </a:r>
+            <a:endParaRPr lang="en-SG" sz="1100" dirty="0">
+              <a:solidFill>
+                <a:srgbClr val="7030A0"/>
+              </a:solidFill>
+            </a:endParaRPr>
+          </a:p>
+        </p:txBody>
+      </p:sp>
+      <p:sp>
+        <p:nvSpPr>
+          <p:cNvPr id="56" name="TextBox 55"/>
+          <p:cNvSpPr txBox="1"/>
+          <p:nvPr/>
+        </p:nvSpPr>
+        <p:spPr>
+          <a:xfrm>
+            <a:off x="5689761" y="2495413"/>
+            <a:ext cx="189257" cy="178683"/>
+          </a:xfrm>
+          <a:prstGeom prst="rect">
+            <a:avLst/>
+          </a:prstGeom>
+          <a:noFill/>
+        </p:spPr>
+        <p:txBody>
+          <a:bodyPr wrap="square" lIns="0" tIns="0" rIns="0" bIns="0" rtlCol="0">
+            <a:noAutofit/>
+          </a:bodyPr>
+          <a:lstStyle/>
+          <a:p>
+            <a:pPr algn="ctr"/>
+            <a:r>
+              <a:rPr lang="en-US" sz="1100" dirty="0" smtClean="0">
+                <a:solidFill>
+                  <a:srgbClr val="7030A0"/>
+                </a:solidFill>
+              </a:rPr>
+              <a:t>1</a:t>
+            </a:r>
+            <a:endParaRPr lang="en-SG" sz="1100" dirty="0">
+              <a:solidFill>
+                <a:srgbClr val="7030A0"/>
+              </a:solidFill>
+            </a:endParaRPr>
+          </a:p>
+        </p:txBody>
+      </p:sp>
+      <p:sp>
+        <p:nvSpPr>
+          <p:cNvPr id="60" name="TextBox 59"/>
+          <p:cNvSpPr txBox="1"/>
+          <p:nvPr/>
+        </p:nvSpPr>
+        <p:spPr>
+          <a:xfrm>
+            <a:off x="5163172" y="1778919"/>
+            <a:ext cx="189257" cy="178683"/>
+          </a:xfrm>
+          <a:prstGeom prst="rect">
+            <a:avLst/>
+          </a:prstGeom>
+          <a:noFill/>
+        </p:spPr>
+        <p:txBody>
+          <a:bodyPr wrap="square" lIns="0" tIns="0" rIns="0" bIns="0" rtlCol="0">
+            <a:noAutofit/>
+          </a:bodyPr>
+          <a:lstStyle/>
+          <a:p>
+            <a:pPr algn="ctr"/>
+            <a:r>
+              <a:rPr lang="en-US" sz="1100" dirty="0" smtClean="0">
+                <a:solidFill>
+                  <a:srgbClr val="7030A0"/>
+                </a:solidFill>
+              </a:rPr>
+              <a:t>*</a:t>
+            </a:r>
+            <a:endParaRPr lang="en-SG" sz="1100" dirty="0">
+              <a:solidFill>
+                <a:srgbClr val="7030A0"/>
+              </a:solidFill>
+            </a:endParaRPr>
+          </a:p>
+        </p:txBody>
+      </p:sp>
+      <p:sp>
+        <p:nvSpPr>
+          <p:cNvPr id="61" name="TextBox 60"/>
+          <p:cNvSpPr txBox="1"/>
+          <p:nvPr/>
+        </p:nvSpPr>
+        <p:spPr>
+          <a:xfrm>
+            <a:off x="6135256" y="3097917"/>
+            <a:ext cx="189257" cy="178683"/>
+          </a:xfrm>
+          <a:prstGeom prst="rect">
+            <a:avLst/>
+          </a:prstGeom>
+          <a:noFill/>
+        </p:spPr>
+        <p:txBody>
+          <a:bodyPr wrap="square" lIns="0" tIns="0" rIns="0" bIns="0" rtlCol="0">
+            <a:noAutofit/>
+          </a:bodyPr>
+          <a:lstStyle/>
+          <a:p>
+            <a:pPr algn="ctr"/>
+            <a:r>
+              <a:rPr lang="en-US" sz="1100" dirty="0" smtClean="0">
+                <a:solidFill>
+                  <a:srgbClr val="7030A0"/>
+                </a:solidFill>
+              </a:rPr>
+              <a:t>*</a:t>
+            </a:r>
+            <a:endParaRPr lang="en-SG" sz="1100" dirty="0">
+              <a:solidFill>
+                <a:srgbClr val="7030A0"/>
+              </a:solidFill>
+            </a:endParaRPr>
+          </a:p>
+        </p:txBody>
+      </p:sp>
+      <p:sp>
+        <p:nvSpPr>
+          <p:cNvPr id="65" name="TextBox 64"/>
+          <p:cNvSpPr txBox="1"/>
+          <p:nvPr/>
+        </p:nvSpPr>
+        <p:spPr>
+          <a:xfrm>
+            <a:off x="2687923" y="2564238"/>
+            <a:ext cx="189257" cy="178683"/>
+          </a:xfrm>
+          <a:prstGeom prst="rect">
+            <a:avLst/>
+          </a:prstGeom>
+          <a:noFill/>
+        </p:spPr>
+        <p:txBody>
+          <a:bodyPr wrap="square" lIns="0" tIns="0" rIns="0" bIns="0" rtlCol="0">
+            <a:noAutofit/>
+          </a:bodyPr>
+          <a:lstStyle/>
+          <a:p>
+            <a:pPr algn="ctr"/>
+            <a:r>
+              <a:rPr lang="en-US" sz="1100" dirty="0" smtClean="0">
+                <a:solidFill>
+                  <a:srgbClr val="7030A0"/>
+                </a:solidFill>
+              </a:rPr>
+              <a:t>1</a:t>
+            </a:r>
+            <a:endParaRPr lang="en-SG" sz="1100" dirty="0">
+              <a:solidFill>
+                <a:srgbClr val="7030A0"/>
+              </a:solidFill>
+            </a:endParaRPr>
+          </a:p>
+        </p:txBody>
+      </p:sp>
+      <p:sp>
+        <p:nvSpPr>
+          <p:cNvPr id="66" name="TextBox 65"/>
+          <p:cNvSpPr txBox="1"/>
+          <p:nvPr/>
+        </p:nvSpPr>
+        <p:spPr>
+          <a:xfrm>
+            <a:off x="2656370" y="3386050"/>
+            <a:ext cx="189257" cy="178683"/>
+          </a:xfrm>
+          <a:prstGeom prst="rect">
+            <a:avLst/>
+          </a:prstGeom>
+          <a:noFill/>
+        </p:spPr>
+        <p:txBody>
+          <a:bodyPr wrap="square" lIns="0" tIns="0" rIns="0" bIns="0" rtlCol="0">
+            <a:noAutofit/>
+          </a:bodyPr>
+          <a:lstStyle/>
+          <a:p>
+            <a:pPr algn="ctr"/>
+            <a:r>
+              <a:rPr lang="en-US" sz="1100" dirty="0" smtClean="0">
+                <a:solidFill>
+                  <a:srgbClr val="7030A0"/>
+                </a:solidFill>
+              </a:rPr>
+              <a:t>1</a:t>
+            </a:r>
+            <a:endParaRPr lang="en-SG" sz="1100" dirty="0">
+              <a:solidFill>
+                <a:srgbClr val="7030A0"/>
+              </a:solidFill>
+            </a:endParaRPr>
+          </a:p>
+        </p:txBody>
+      </p:sp>
+      <p:sp>
+        <p:nvSpPr>
+          <p:cNvPr id="70" name="TextBox 69"/>
+          <p:cNvSpPr txBox="1"/>
+          <p:nvPr/>
+        </p:nvSpPr>
+        <p:spPr>
+          <a:xfrm>
+            <a:off x="6667770" y="3210194"/>
+            <a:ext cx="189257" cy="178683"/>
+          </a:xfrm>
+          <a:prstGeom prst="rect">
+            <a:avLst/>
+          </a:prstGeom>
+          <a:noFill/>
+        </p:spPr>
+        <p:txBody>
+          <a:bodyPr wrap="square" lIns="0" tIns="0" rIns="0" bIns="0" rtlCol="0">
+            <a:noAutofit/>
+          </a:bodyPr>
+          <a:lstStyle/>
+          <a:p>
+            <a:pPr algn="ctr"/>
+            <a:r>
+              <a:rPr lang="en-US" sz="1100" dirty="0" smtClean="0">
+                <a:solidFill>
+                  <a:srgbClr val="7030A0"/>
+                </a:solidFill>
+              </a:rPr>
+              <a:t>1</a:t>
+            </a:r>
+            <a:endParaRPr lang="en-SG" sz="1100" dirty="0">
+              <a:solidFill>
+                <a:srgbClr val="7030A0"/>
+              </a:solidFill>
+            </a:endParaRPr>
+          </a:p>
+        </p:txBody>
+      </p:sp>
     </p:spTree>
     <p:extLst>
       <p:ext uri="{BB962C8B-B14F-4D97-AF65-F5344CB8AC3E}">

</xml_diff>